<commit_message>
se ha actualizado bastante informacion
</commit_message>
<xml_diff>
--- a/clases/informatica_aplicada/clase_2/clase2.pptx
+++ b/clases/informatica_aplicada/clase_2/clase2.pptx
@@ -211,7 +211,7 @@
           <a:p>
             <a:fld id="{E83CA259-FC0E-45CB-92ED-4988E6F04674}" type="datetimeFigureOut">
               <a:rPr lang="es-ES" smtClean="0"/>
-              <a:t>13/05/2015</a:t>
+              <a:t>14/05/2015</a:t>
             </a:fld>
             <a:endParaRPr lang="es-ES"/>
           </a:p>
@@ -550,7 +550,7 @@
           <a:p>
             <a:fld id="{7A847CFC-816F-41D0-AAC0-9BF4FEBC753E}" type="datetimeFigureOut">
               <a:rPr lang="es-ES" smtClean="0"/>
-              <a:t>13/05/2015</a:t>
+              <a:t>14/05/2015</a:t>
             </a:fld>
             <a:endParaRPr lang="es-ES"/>
           </a:p>
@@ -1075,7 +1075,7 @@
           <a:p>
             <a:fld id="{7A847CFC-816F-41D0-AAC0-9BF4FEBC753E}" type="datetimeFigureOut">
               <a:rPr lang="es-ES" smtClean="0"/>
-              <a:t>13/05/2015</a:t>
+              <a:t>14/05/2015</a:t>
             </a:fld>
             <a:endParaRPr lang="es-ES"/>
           </a:p>
@@ -1389,7 +1389,7 @@
           <a:p>
             <a:fld id="{7A847CFC-816F-41D0-AAC0-9BF4FEBC753E}" type="datetimeFigureOut">
               <a:rPr lang="es-ES" smtClean="0"/>
-              <a:t>13/05/2015</a:t>
+              <a:t>14/05/2015</a:t>
             </a:fld>
             <a:endParaRPr lang="es-ES"/>
           </a:p>
@@ -1675,7 +1675,7 @@
           <a:p>
             <a:fld id="{7A847CFC-816F-41D0-AAC0-9BF4FEBC753E}" type="datetimeFigureOut">
               <a:rPr lang="es-ES" smtClean="0"/>
-              <a:t>13/05/2015</a:t>
+              <a:t>14/05/2015</a:t>
             </a:fld>
             <a:endParaRPr lang="es-ES"/>
           </a:p>
@@ -2250,7 +2250,7 @@
           <a:p>
             <a:fld id="{7A847CFC-816F-41D0-AAC0-9BF4FEBC753E}" type="datetimeFigureOut">
               <a:rPr lang="es-ES" smtClean="0"/>
-              <a:t>13/05/2015</a:t>
+              <a:t>14/05/2015</a:t>
             </a:fld>
             <a:endParaRPr lang="es-ES"/>
           </a:p>
@@ -2340,7 +2340,7 @@
           <a:p>
             <a:fld id="{7A847CFC-816F-41D0-AAC0-9BF4FEBC753E}" type="datetimeFigureOut">
               <a:rPr lang="es-ES" smtClean="0"/>
-              <a:t>13/05/2015</a:t>
+              <a:t>14/05/2015</a:t>
             </a:fld>
             <a:endParaRPr lang="es-ES"/>
           </a:p>
@@ -3049,7 +3049,7 @@
           <a:p>
             <a:fld id="{7A847CFC-816F-41D0-AAC0-9BF4FEBC753E}" type="datetimeFigureOut">
               <a:rPr lang="es-ES" smtClean="0"/>
-              <a:t>13/05/2015</a:t>
+              <a:t>14/05/2015</a:t>
             </a:fld>
             <a:endParaRPr lang="es-ES"/>
           </a:p>
@@ -3301,7 +3301,7 @@
           <a:p>
             <a:fld id="{7A847CFC-816F-41D0-AAC0-9BF4FEBC753E}" type="datetimeFigureOut">
               <a:rPr lang="es-ES" smtClean="0"/>
-              <a:t>13/05/2015</a:t>
+              <a:t>14/05/2015</a:t>
             </a:fld>
             <a:endParaRPr lang="es-ES"/>
           </a:p>
@@ -3530,7 +3530,7 @@
           <a:p>
             <a:fld id="{7A847CFC-816F-41D0-AAC0-9BF4FEBC753E}" type="datetimeFigureOut">
               <a:rPr lang="es-ES" smtClean="0"/>
-              <a:t>13/05/2015</a:t>
+              <a:t>14/05/2015</a:t>
             </a:fld>
             <a:endParaRPr lang="es-ES"/>
           </a:p>
@@ -3804,7 +3804,7 @@
           <a:p>
             <a:fld id="{7A847CFC-816F-41D0-AAC0-9BF4FEBC753E}" type="datetimeFigureOut">
               <a:rPr lang="es-ES" smtClean="0"/>
-              <a:t>13/05/2015</a:t>
+              <a:t>14/05/2015</a:t>
             </a:fld>
             <a:endParaRPr lang="es-ES"/>
           </a:p>
@@ -4090,7 +4090,7 @@
           <a:p>
             <a:fld id="{7A847CFC-816F-41D0-AAC0-9BF4FEBC753E}" type="datetimeFigureOut">
               <a:rPr lang="es-ES" smtClean="0"/>
-              <a:t>13/05/2015</a:t>
+              <a:t>14/05/2015</a:t>
             </a:fld>
             <a:endParaRPr lang="es-ES"/>
           </a:p>
@@ -4358,7 +4358,7 @@
           <a:p>
             <a:fld id="{7A847CFC-816F-41D0-AAC0-9BF4FEBC753E}" type="datetimeFigureOut">
               <a:rPr lang="es-ES" smtClean="0"/>
-              <a:t>13/05/2015</a:t>
+              <a:t>14/05/2015</a:t>
             </a:fld>
             <a:endParaRPr lang="es-ES"/>
           </a:p>
@@ -7929,7 +7929,15 @@
           <a:p>
             <a:r>
               <a:rPr lang="es-ES" sz="3600" dirty="0" smtClean="0"/>
-              <a:t>Formato Alineación de Celdas</a:t>
+              <a:t>Formato </a:t>
+            </a:r>
+            <a:r>
+              <a:rPr lang="es-ES" sz="3600" dirty="0" smtClean="0"/>
+              <a:t>Fuente de </a:t>
+            </a:r>
+            <a:r>
+              <a:rPr lang="es-ES" sz="3600" dirty="0" smtClean="0"/>
+              <a:t>Celdas</a:t>
             </a:r>
             <a:endParaRPr lang="es-ES" sz="3600" dirty="0"/>
           </a:p>

</xml_diff>